<commit_message>
Add render.py, create python package
</commit_message>
<xml_diff>
--- a/test/data3/out.pptx
+++ b/test/data3/out.pptx
@@ -3125,9 +3125,7 @@
               </a:defRPr>
             </a:lvl1pPr>
           </a:lstStyle>
-          <a:p>
-            <a:pPr/>
-          </a:p>
+          <a:p/>
         </p:txBody>
       </p:sp>
       <p:graphicFrame>

</xml_diff>